<commit_message>
Fixed diagram width in ipynb.
</commit_message>
<xml_diff>
--- a/presentations/code_diagram.pptx
+++ b/presentations/code_diagram.pptx
@@ -7753,14 +7753,14 @@
             <p:nvPr/>
           </p:nvCxnSpPr>
           <p:spPr>
-            <a:xfrm flipH="1">
-              <a:off x="2739852" y="4426705"/>
-              <a:ext cx="5264" cy="929685"/>
+            <a:xfrm>
+              <a:off x="2745116" y="4426705"/>
+              <a:ext cx="0" cy="908616"/>
             </a:xfrm>
             <a:prstGeom prst="straightConnector1">
               <a:avLst/>
             </a:prstGeom>
-            <a:ln w="9525">
+            <a:ln w="6350">
               <a:solidFill>
                 <a:schemeClr val="tx1"/>
               </a:solidFill>

</xml_diff>